<commit_message>
Update exercises for day 1
</commit_message>
<xml_diff>
--- a/01. QA Track Introduction/QA-Track-Introduction.pptx
+++ b/01. QA Track Introduction/QA-Track-Introduction.pptx
@@ -261,7 +261,7 @@
             <a:fld id="{70B08E2B-E143-48A0-851B-749BC0A49ECB}" type="datetimeFigureOut">
               <a:rPr lang="en-US" smtClean="0"/>
               <a:pPr/>
-              <a:t>11/5/2015</a:t>
+              <a:t>11/9/2015</a:t>
             </a:fld>
             <a:endParaRPr lang="en-US"/>
           </a:p>
@@ -15456,7 +15456,7 @@
         </p:blipFill>
         <p:spPr>
           <a:xfrm>
-            <a:off x="6711021" y="4047066"/>
+            <a:off x="6888656" y="4038521"/>
             <a:ext cx="2026744" cy="1981200"/>
           </a:xfrm>
           <a:prstGeom prst="roundRect">
@@ -19570,11 +19570,7 @@
           <a:p>
             <a:r>
               <a:rPr lang="en-US" dirty="0" smtClean="0"/>
-              <a:t>Recommended </a:t>
-            </a:r>
-            <a:r>
-              <a:rPr lang="en-US" dirty="0" smtClean="0"/>
-              <a:t>Books</a:t>
+              <a:t>Recommended Books</a:t>
             </a:r>
             <a:endParaRPr lang="en-US" dirty="0"/>
           </a:p>
@@ -19710,29 +19706,7 @@
                   </a:schemeClr>
                 </a:solidFill>
               </a:rPr>
-              <a:t>A </a:t>
-            </a:r>
-            <a:r>
-              <a:rPr lang="en-US" sz="2800" dirty="0" smtClean="0">
-                <a:solidFill>
-                  <a:schemeClr val="accent5">
-                    <a:lumMod val="20000"/>
-                    <a:lumOff val="80000"/>
-                  </a:schemeClr>
-                </a:solidFill>
-              </a:rPr>
-              <a:t>Practitioner's Guide to Software Test </a:t>
-            </a:r>
-            <a:r>
-              <a:rPr lang="en-US" sz="2800" dirty="0" smtClean="0">
-                <a:solidFill>
-                  <a:schemeClr val="accent5">
-                    <a:lumMod val="20000"/>
-                    <a:lumOff val="80000"/>
-                  </a:schemeClr>
-                </a:solidFill>
-              </a:rPr>
-              <a:t>Design</a:t>
+              <a:t>A Practitioner's Guide to Software Test Design</a:t>
             </a:r>
             <a:endParaRPr lang="en-US" sz="2800" dirty="0"/>
           </a:p>
@@ -19748,11 +19722,7 @@
             </a:pPr>
             <a:r>
               <a:rPr lang="en-US" sz="2800" dirty="0" smtClean="0"/>
-              <a:t>By Lee </a:t>
-            </a:r>
-            <a:r>
-              <a:rPr lang="en-US" sz="2800" dirty="0" smtClean="0"/>
-              <a:t>Copeland</a:t>
+              <a:t>By Lee Copeland</a:t>
             </a:r>
             <a:r>
               <a:rPr lang="en-US" sz="2800" dirty="0" smtClean="0">
@@ -19953,11 +19923,7 @@
           <a:p>
             <a:r>
               <a:rPr lang="en-US" dirty="0" smtClean="0"/>
-              <a:t>Recommended Books </a:t>
-            </a:r>
-            <a:r>
-              <a:rPr lang="en-US" dirty="0" smtClean="0"/>
-              <a:t>(2)</a:t>
+              <a:t>Recommended Books (2)</a:t>
             </a:r>
             <a:endParaRPr lang="en-US" dirty="0"/>
           </a:p>
@@ -20001,29 +19967,7 @@
                   </a:schemeClr>
                 </a:solidFill>
               </a:rPr>
-              <a:t>Pragmatic </a:t>
-            </a:r>
-            <a:r>
-              <a:rPr lang="en-US" sz="2800" dirty="0">
-                <a:solidFill>
-                  <a:schemeClr val="accent5">
-                    <a:lumMod val="20000"/>
-                    <a:lumOff val="80000"/>
-                  </a:schemeClr>
-                </a:solidFill>
-              </a:rPr>
-              <a:t>Software Testing: Becoming an Effective and Efficient </a:t>
-            </a:r>
-            <a:r>
-              <a:rPr lang="en-US" sz="2800" dirty="0">
-                <a:solidFill>
-                  <a:schemeClr val="accent5">
-                    <a:lumMod val="20000"/>
-                    <a:lumOff val="80000"/>
-                  </a:schemeClr>
-                </a:solidFill>
-              </a:rPr>
-              <a:t>Test Professional</a:t>
+              <a:t>Pragmatic Software Testing: Becoming an Effective and Efficient Test Professional</a:t>
             </a:r>
             <a:r>
               <a:rPr lang="en-US" sz="2800" dirty="0"/>
@@ -20427,11 +20371,7 @@
           <a:p>
             <a:r>
               <a:rPr lang="en-US" dirty="0" smtClean="0"/>
-              <a:t>Recommended </a:t>
-            </a:r>
-            <a:r>
-              <a:rPr lang="en-US" dirty="0" smtClean="0"/>
-              <a:t>Books (3)</a:t>
+              <a:t>Recommended Books (3)</a:t>
             </a:r>
             <a:endParaRPr lang="en-US" dirty="0"/>
           </a:p>
@@ -20475,10 +20415,10 @@
                   </a:schemeClr>
                 </a:solidFill>
               </a:rPr>
-              <a:t>Advanced Software </a:t>
-            </a:r>
-            <a:r>
-              <a:rPr lang="en-US" sz="2800" dirty="0">
+              <a:t>Advanced Software Testing Vol. 1: Guide to the ISTQB Advanced Certification as an Advanced Test </a:t>
+            </a:r>
+            <a:r>
+              <a:rPr lang="en-US" sz="2800" dirty="0" smtClean="0">
                 <a:solidFill>
                   <a:schemeClr val="accent5">
                     <a:lumMod val="20000"/>
@@ -20486,50 +20426,6 @@
                   </a:schemeClr>
                 </a:solidFill>
               </a:rPr>
-              <a:t>Testing </a:t>
-            </a:r>
-            <a:r>
-              <a:rPr lang="en-US" sz="2800" dirty="0">
-                <a:solidFill>
-                  <a:schemeClr val="accent5">
-                    <a:lumMod val="20000"/>
-                    <a:lumOff val="80000"/>
-                  </a:schemeClr>
-                </a:solidFill>
-              </a:rPr>
-              <a:t>Vol. </a:t>
-            </a:r>
-            <a:r>
-              <a:rPr lang="en-US" sz="2800" dirty="0">
-                <a:solidFill>
-                  <a:schemeClr val="accent5">
-                    <a:lumMod val="20000"/>
-                    <a:lumOff val="80000"/>
-                  </a:schemeClr>
-                </a:solidFill>
-              </a:rPr>
-              <a:t>1: </a:t>
-            </a:r>
-            <a:r>
-              <a:rPr lang="en-US" sz="2800" dirty="0">
-                <a:solidFill>
-                  <a:schemeClr val="accent5">
-                    <a:lumMod val="20000"/>
-                    <a:lumOff val="80000"/>
-                  </a:schemeClr>
-                </a:solidFill>
-              </a:rPr>
-              <a:t>Guide to the ISTQB Advanced Certification as an Advanced Test </a:t>
-            </a:r>
-            <a:r>
-              <a:rPr lang="en-US" sz="2800" dirty="0" smtClean="0">
-                <a:solidFill>
-                  <a:schemeClr val="accent5">
-                    <a:lumMod val="20000"/>
-                    <a:lumOff val="80000"/>
-                  </a:schemeClr>
-                </a:solidFill>
-              </a:rPr>
               <a:t>Analyst</a:t>
             </a:r>
             <a:r>
@@ -20541,11 +20437,7 @@
             </a:br>
             <a:r>
               <a:rPr lang="en-US" sz="2800" dirty="0" smtClean="0"/>
-              <a:t>By Rex </a:t>
-            </a:r>
-            <a:r>
-              <a:rPr lang="en-US" sz="2800" dirty="0" smtClean="0"/>
-              <a:t>Black</a:t>
+              <a:t>By Rex Black</a:t>
             </a:r>
             <a:br>
               <a:rPr lang="en-US" sz="2800" dirty="0" smtClean="0"/>
@@ -20831,11 +20723,7 @@
           <a:p>
             <a:r>
               <a:rPr lang="en-US" dirty="0" smtClean="0"/>
-              <a:t>Recommended Books </a:t>
-            </a:r>
-            <a:r>
-              <a:rPr lang="en-US" dirty="0" smtClean="0"/>
-              <a:t>(4)</a:t>
+              <a:t>Recommended Books (4)</a:t>
             </a:r>
             <a:endParaRPr lang="en-US" dirty="0"/>
           </a:p>
@@ -20982,18 +20870,6 @@
               </a:rPr>
               <a:t>By Eric Freeman, Elisabeth Robson, Bert Bates, Kathy Sierra</a:t>
             </a:r>
-            <a:endParaRPr lang="en-US" sz="2800" b="1" dirty="0">
-              <a:solidFill>
-                <a:srgbClr val="EBFFD2"/>
-              </a:solidFill>
-              <a:effectLst>
-                <a:outerShdw blurRad="38100" dist="38100" dir="2700000" algn="tl">
-                  <a:srgbClr val="000000">
-                    <a:alpha val="43137"/>
-                  </a:srgbClr>
-                </a:outerShdw>
-              </a:effectLst>
-            </a:endParaRPr>
           </a:p>
         </p:txBody>
       </p:sp>
@@ -21148,11 +21024,7 @@
           <a:p>
             <a:r>
               <a:rPr lang="en-US" dirty="0" smtClean="0"/>
-              <a:t>Recommended Books </a:t>
-            </a:r>
-            <a:r>
-              <a:rPr lang="en-US" dirty="0" smtClean="0"/>
-              <a:t>(5)</a:t>
+              <a:t>Recommended Books (5)</a:t>
             </a:r>
             <a:endParaRPr lang="en-US" dirty="0"/>
           </a:p>

</xml_diff>